<commit_message>
update images + structure
</commit_message>
<xml_diff>
--- a/docs/_site/pipeline.pptx
+++ b/docs/_site/pipeline.pptx
@@ -6,6 +6,7 @@
   </p:sldMasterIdLst>
   <p:sldIdLst>
     <p:sldId id="256" r:id="rId2"/>
+    <p:sldId id="257" r:id="rId3"/>
   </p:sldIdLst>
   <p:sldSz cx="12192000" cy="6858000"/>
   <p:notesSz cx="6858000" cy="9144000"/>
@@ -261,7 +262,7 @@
           <a:p>
             <a:fld id="{5F2B1D35-0879-4C22-837B-E502B80E253A}" type="datetimeFigureOut">
               <a:rPr lang="nl-BE" smtClean="0"/>
-              <a:t>15/03/2024</a:t>
+              <a:t>26/03/2024</a:t>
             </a:fld>
             <a:endParaRPr lang="nl-BE"/>
           </a:p>
@@ -461,7 +462,7 @@
           <a:p>
             <a:fld id="{5F2B1D35-0879-4C22-837B-E502B80E253A}" type="datetimeFigureOut">
               <a:rPr lang="nl-BE" smtClean="0"/>
-              <a:t>15/03/2024</a:t>
+              <a:t>26/03/2024</a:t>
             </a:fld>
             <a:endParaRPr lang="nl-BE"/>
           </a:p>
@@ -671,7 +672,7 @@
           <a:p>
             <a:fld id="{5F2B1D35-0879-4C22-837B-E502B80E253A}" type="datetimeFigureOut">
               <a:rPr lang="nl-BE" smtClean="0"/>
-              <a:t>15/03/2024</a:t>
+              <a:t>26/03/2024</a:t>
             </a:fld>
             <a:endParaRPr lang="nl-BE"/>
           </a:p>
@@ -871,7 +872,7 @@
           <a:p>
             <a:fld id="{5F2B1D35-0879-4C22-837B-E502B80E253A}" type="datetimeFigureOut">
               <a:rPr lang="nl-BE" smtClean="0"/>
-              <a:t>15/03/2024</a:t>
+              <a:t>26/03/2024</a:t>
             </a:fld>
             <a:endParaRPr lang="nl-BE"/>
           </a:p>
@@ -1147,7 +1148,7 @@
           <a:p>
             <a:fld id="{5F2B1D35-0879-4C22-837B-E502B80E253A}" type="datetimeFigureOut">
               <a:rPr lang="nl-BE" smtClean="0"/>
-              <a:t>15/03/2024</a:t>
+              <a:t>26/03/2024</a:t>
             </a:fld>
             <a:endParaRPr lang="nl-BE"/>
           </a:p>
@@ -1415,7 +1416,7 @@
           <a:p>
             <a:fld id="{5F2B1D35-0879-4C22-837B-E502B80E253A}" type="datetimeFigureOut">
               <a:rPr lang="nl-BE" smtClean="0"/>
-              <a:t>15/03/2024</a:t>
+              <a:t>26/03/2024</a:t>
             </a:fld>
             <a:endParaRPr lang="nl-BE"/>
           </a:p>
@@ -1830,7 +1831,7 @@
           <a:p>
             <a:fld id="{5F2B1D35-0879-4C22-837B-E502B80E253A}" type="datetimeFigureOut">
               <a:rPr lang="nl-BE" smtClean="0"/>
-              <a:t>15/03/2024</a:t>
+              <a:t>26/03/2024</a:t>
             </a:fld>
             <a:endParaRPr lang="nl-BE"/>
           </a:p>
@@ -1972,7 +1973,7 @@
           <a:p>
             <a:fld id="{5F2B1D35-0879-4C22-837B-E502B80E253A}" type="datetimeFigureOut">
               <a:rPr lang="nl-BE" smtClean="0"/>
-              <a:t>15/03/2024</a:t>
+              <a:t>26/03/2024</a:t>
             </a:fld>
             <a:endParaRPr lang="nl-BE"/>
           </a:p>
@@ -2085,7 +2086,7 @@
           <a:p>
             <a:fld id="{5F2B1D35-0879-4C22-837B-E502B80E253A}" type="datetimeFigureOut">
               <a:rPr lang="nl-BE" smtClean="0"/>
-              <a:t>15/03/2024</a:t>
+              <a:t>26/03/2024</a:t>
             </a:fld>
             <a:endParaRPr lang="nl-BE"/>
           </a:p>
@@ -2398,7 +2399,7 @@
           <a:p>
             <a:fld id="{5F2B1D35-0879-4C22-837B-E502B80E253A}" type="datetimeFigureOut">
               <a:rPr lang="nl-BE" smtClean="0"/>
-              <a:t>15/03/2024</a:t>
+              <a:t>26/03/2024</a:t>
             </a:fld>
             <a:endParaRPr lang="nl-BE"/>
           </a:p>
@@ -2687,7 +2688,7 @@
           <a:p>
             <a:fld id="{5F2B1D35-0879-4C22-837B-E502B80E253A}" type="datetimeFigureOut">
               <a:rPr lang="nl-BE" smtClean="0"/>
-              <a:t>15/03/2024</a:t>
+              <a:t>26/03/2024</a:t>
             </a:fld>
             <a:endParaRPr lang="nl-BE"/>
           </a:p>
@@ -2930,7 +2931,7 @@
           <a:p>
             <a:fld id="{5F2B1D35-0879-4C22-837B-E502B80E253A}" type="datetimeFigureOut">
               <a:rPr lang="nl-BE" smtClean="0"/>
-              <a:t>15/03/2024</a:t>
+              <a:t>26/03/2024</a:t>
             </a:fld>
             <a:endParaRPr lang="nl-BE"/>
           </a:p>
@@ -3500,6 +3501,483 @@
 </p:sld>
 </file>
 
+<file path=ppt/slides/slide2.xml><?xml version="1.0" encoding="utf-8"?>
+<p:sld xmlns:a="http://schemas.openxmlformats.org/drawingml/2006/main" xmlns:r="http://schemas.openxmlformats.org/officeDocument/2006/relationships" xmlns:p="http://schemas.openxmlformats.org/presentationml/2006/main">
+  <p:cSld>
+    <p:spTree>
+      <p:nvGrpSpPr>
+        <p:cNvPr id="1" name=""/>
+        <p:cNvGrpSpPr/>
+        <p:nvPr/>
+      </p:nvGrpSpPr>
+      <p:grpSpPr>
+        <a:xfrm>
+          <a:off x="0" y="0"/>
+          <a:ext cx="0" cy="0"/>
+          <a:chOff x="0" y="0"/>
+          <a:chExt cx="0" cy="0"/>
+        </a:xfrm>
+      </p:grpSpPr>
+      <p:pic>
+        <p:nvPicPr>
+          <p:cNvPr id="1026" name="Picture 2" descr="alt text">
+            <a:extLst>
+              <a:ext uri="{FF2B5EF4-FFF2-40B4-BE49-F238E27FC236}">
+                <a16:creationId xmlns:a16="http://schemas.microsoft.com/office/drawing/2014/main" id="{1C2DA778-4014-F5BD-1C3E-28270F00213F}"/>
+              </a:ext>
+            </a:extLst>
+          </p:cNvPr>
+          <p:cNvPicPr>
+            <a:picLocks noChangeAspect="1" noChangeArrowheads="1"/>
+          </p:cNvPicPr>
+          <p:nvPr/>
+        </p:nvPicPr>
+        <p:blipFill rotWithShape="1">
+          <a:blip r:embed="rId2">
+            <a:extLst>
+              <a:ext uri="{28A0092B-C50C-407E-A947-70E740481C1C}">
+                <a14:useLocalDpi xmlns:a14="http://schemas.microsoft.com/office/drawing/2010/main" val="0"/>
+              </a:ext>
+            </a:extLst>
+          </a:blip>
+          <a:srcRect r="77187"/>
+          <a:stretch/>
+        </p:blipFill>
+        <p:spPr bwMode="auto">
+          <a:xfrm>
+            <a:off x="3187" y="1920251"/>
+            <a:ext cx="2781300" cy="2852737"/>
+          </a:xfrm>
+          <a:prstGeom prst="rect">
+            <a:avLst/>
+          </a:prstGeom>
+          <a:noFill/>
+          <a:extLst>
+            <a:ext uri="{909E8E84-426E-40DD-AFC4-6F175D3DCCD1}">
+              <a14:hiddenFill xmlns:a14="http://schemas.microsoft.com/office/drawing/2010/main">
+                <a:solidFill>
+                  <a:srgbClr val="FFFFFF"/>
+                </a:solidFill>
+              </a14:hiddenFill>
+            </a:ext>
+          </a:extLst>
+        </p:spPr>
+      </p:pic>
+      <p:pic>
+        <p:nvPicPr>
+          <p:cNvPr id="1028" name="Picture 4" descr="alt text">
+            <a:extLst>
+              <a:ext uri="{FF2B5EF4-FFF2-40B4-BE49-F238E27FC236}">
+                <a16:creationId xmlns:a16="http://schemas.microsoft.com/office/drawing/2014/main" id="{D2A8CB99-E1AF-E99A-4294-CE8215BB3FD1}"/>
+              </a:ext>
+            </a:extLst>
+          </p:cNvPr>
+          <p:cNvPicPr>
+            <a:picLocks noChangeAspect="1" noChangeArrowheads="1"/>
+          </p:cNvPicPr>
+          <p:nvPr/>
+        </p:nvPicPr>
+        <p:blipFill rotWithShape="1">
+          <a:blip r:embed="rId2">
+            <a:extLst>
+              <a:ext uri="{28A0092B-C50C-407E-A947-70E740481C1C}">
+                <a14:useLocalDpi xmlns:a14="http://schemas.microsoft.com/office/drawing/2010/main" val="0"/>
+              </a:ext>
+            </a:extLst>
+          </a:blip>
+          <a:srcRect l="28047" r="42890"/>
+          <a:stretch/>
+        </p:blipFill>
+        <p:spPr bwMode="auto">
+          <a:xfrm>
+            <a:off x="5831616" y="1927699"/>
+            <a:ext cx="3543301" cy="2852737"/>
+          </a:xfrm>
+          <a:prstGeom prst="rect">
+            <a:avLst/>
+          </a:prstGeom>
+          <a:noFill/>
+          <a:extLst>
+            <a:ext uri="{909E8E84-426E-40DD-AFC4-6F175D3DCCD1}">
+              <a14:hiddenFill xmlns:a14="http://schemas.microsoft.com/office/drawing/2010/main">
+                <a:solidFill>
+                  <a:srgbClr val="FFFFFF"/>
+                </a:solidFill>
+              </a14:hiddenFill>
+            </a:ext>
+          </a:extLst>
+        </p:spPr>
+      </p:pic>
+      <p:sp>
+        <p:nvSpPr>
+          <p:cNvPr id="5" name="Rechthoek 4">
+            <a:extLst>
+              <a:ext uri="{FF2B5EF4-FFF2-40B4-BE49-F238E27FC236}">
+                <a16:creationId xmlns:a16="http://schemas.microsoft.com/office/drawing/2014/main" id="{24344252-ED86-033A-CF0D-B74A07B982D2}"/>
+              </a:ext>
+            </a:extLst>
+          </p:cNvPr>
+          <p:cNvSpPr/>
+          <p:nvPr/>
+        </p:nvSpPr>
+        <p:spPr>
+          <a:xfrm>
+            <a:off x="1739051" y="2541116"/>
+            <a:ext cx="1358376" cy="514350"/>
+          </a:xfrm>
+          <a:prstGeom prst="rect">
+            <a:avLst/>
+          </a:prstGeom>
+          <a:solidFill>
+            <a:schemeClr val="bg1"/>
+          </a:solidFill>
+          <a:ln>
+            <a:solidFill>
+              <a:schemeClr val="bg1"/>
+            </a:solidFill>
+          </a:ln>
+        </p:spPr>
+        <p:style>
+          <a:lnRef idx="2">
+            <a:schemeClr val="accent1">
+              <a:shade val="15000"/>
+            </a:schemeClr>
+          </a:lnRef>
+          <a:fillRef idx="1">
+            <a:schemeClr val="accent1"/>
+          </a:fillRef>
+          <a:effectRef idx="0">
+            <a:schemeClr val="accent1"/>
+          </a:effectRef>
+          <a:fontRef idx="minor">
+            <a:schemeClr val="lt1"/>
+          </a:fontRef>
+        </p:style>
+        <p:txBody>
+          <a:bodyPr rtlCol="0" anchor="ctr"/>
+          <a:lstStyle/>
+          <a:p>
+            <a:pPr algn="ctr"/>
+            <a:endParaRPr lang="nl-BE">
+              <a:ln>
+                <a:solidFill>
+                  <a:schemeClr val="bg1"/>
+                </a:solidFill>
+              </a:ln>
+              <a:solidFill>
+                <a:schemeClr val="bg1"/>
+              </a:solidFill>
+            </a:endParaRPr>
+          </a:p>
+        </p:txBody>
+      </p:sp>
+      <p:sp>
+        <p:nvSpPr>
+          <p:cNvPr id="6" name="Rechthoek 5">
+            <a:extLst>
+              <a:ext uri="{FF2B5EF4-FFF2-40B4-BE49-F238E27FC236}">
+                <a16:creationId xmlns:a16="http://schemas.microsoft.com/office/drawing/2014/main" id="{89F50664-8427-BEBE-59E5-FBA7A8635502}"/>
+              </a:ext>
+            </a:extLst>
+          </p:cNvPr>
+          <p:cNvSpPr/>
+          <p:nvPr/>
+        </p:nvSpPr>
+        <p:spPr>
+          <a:xfrm>
+            <a:off x="2722620" y="2850292"/>
+            <a:ext cx="226526" cy="1639330"/>
+          </a:xfrm>
+          <a:prstGeom prst="rect">
+            <a:avLst/>
+          </a:prstGeom>
+          <a:solidFill>
+            <a:schemeClr val="bg1"/>
+          </a:solidFill>
+          <a:ln>
+            <a:solidFill>
+              <a:schemeClr val="bg1"/>
+            </a:solidFill>
+          </a:ln>
+        </p:spPr>
+        <p:style>
+          <a:lnRef idx="2">
+            <a:schemeClr val="accent1">
+              <a:shade val="15000"/>
+            </a:schemeClr>
+          </a:lnRef>
+          <a:fillRef idx="1">
+            <a:schemeClr val="accent1"/>
+          </a:fillRef>
+          <a:effectRef idx="0">
+            <a:schemeClr val="accent1"/>
+          </a:effectRef>
+          <a:fontRef idx="minor">
+            <a:schemeClr val="lt1"/>
+          </a:fontRef>
+        </p:style>
+        <p:txBody>
+          <a:bodyPr rtlCol="0" anchor="ctr"/>
+          <a:lstStyle/>
+          <a:p>
+            <a:pPr algn="ctr"/>
+            <a:endParaRPr lang="nl-BE">
+              <a:ln>
+                <a:solidFill>
+                  <a:schemeClr val="bg1"/>
+                </a:solidFill>
+              </a:ln>
+              <a:solidFill>
+                <a:schemeClr val="bg1"/>
+              </a:solidFill>
+            </a:endParaRPr>
+          </a:p>
+        </p:txBody>
+      </p:sp>
+      <p:sp>
+        <p:nvSpPr>
+          <p:cNvPr id="7" name="Rechthoek 6">
+            <a:extLst>
+              <a:ext uri="{FF2B5EF4-FFF2-40B4-BE49-F238E27FC236}">
+                <a16:creationId xmlns:a16="http://schemas.microsoft.com/office/drawing/2014/main" id="{194DA90A-B630-8326-4106-724DE61B2732}"/>
+              </a:ext>
+            </a:extLst>
+          </p:cNvPr>
+          <p:cNvSpPr/>
+          <p:nvPr/>
+        </p:nvSpPr>
+        <p:spPr>
+          <a:xfrm>
+            <a:off x="2043432" y="3989688"/>
+            <a:ext cx="1358376" cy="514350"/>
+          </a:xfrm>
+          <a:prstGeom prst="rect">
+            <a:avLst/>
+          </a:prstGeom>
+          <a:solidFill>
+            <a:schemeClr val="bg1"/>
+          </a:solidFill>
+          <a:ln>
+            <a:solidFill>
+              <a:schemeClr val="bg1"/>
+            </a:solidFill>
+          </a:ln>
+        </p:spPr>
+        <p:style>
+          <a:lnRef idx="2">
+            <a:schemeClr val="accent1">
+              <a:shade val="15000"/>
+            </a:schemeClr>
+          </a:lnRef>
+          <a:fillRef idx="1">
+            <a:schemeClr val="accent1"/>
+          </a:fillRef>
+          <a:effectRef idx="0">
+            <a:schemeClr val="accent1"/>
+          </a:effectRef>
+          <a:fontRef idx="minor">
+            <a:schemeClr val="lt1"/>
+          </a:fontRef>
+        </p:style>
+        <p:txBody>
+          <a:bodyPr rtlCol="0" anchor="ctr"/>
+          <a:lstStyle/>
+          <a:p>
+            <a:pPr algn="ctr"/>
+            <a:endParaRPr lang="nl-BE">
+              <a:ln>
+                <a:solidFill>
+                  <a:schemeClr val="bg1"/>
+                </a:solidFill>
+              </a:ln>
+              <a:solidFill>
+                <a:schemeClr val="bg1"/>
+              </a:solidFill>
+            </a:endParaRPr>
+          </a:p>
+        </p:txBody>
+      </p:sp>
+      <p:sp>
+        <p:nvSpPr>
+          <p:cNvPr id="8" name="Rechthoek 7">
+            <a:extLst>
+              <a:ext uri="{FF2B5EF4-FFF2-40B4-BE49-F238E27FC236}">
+                <a16:creationId xmlns:a16="http://schemas.microsoft.com/office/drawing/2014/main" id="{BDE00B42-21AA-C4C5-0CA0-670CE9E91F76}"/>
+              </a:ext>
+            </a:extLst>
+          </p:cNvPr>
+          <p:cNvSpPr/>
+          <p:nvPr/>
+        </p:nvSpPr>
+        <p:spPr>
+          <a:xfrm>
+            <a:off x="2260116" y="2850292"/>
+            <a:ext cx="45719" cy="1256384"/>
+          </a:xfrm>
+          <a:prstGeom prst="rect">
+            <a:avLst/>
+          </a:prstGeom>
+          <a:solidFill>
+            <a:schemeClr val="bg1"/>
+          </a:solidFill>
+          <a:ln>
+            <a:solidFill>
+              <a:schemeClr val="bg1"/>
+            </a:solidFill>
+          </a:ln>
+        </p:spPr>
+        <p:style>
+          <a:lnRef idx="2">
+            <a:schemeClr val="accent1">
+              <a:shade val="15000"/>
+            </a:schemeClr>
+          </a:lnRef>
+          <a:fillRef idx="1">
+            <a:schemeClr val="accent1"/>
+          </a:fillRef>
+          <a:effectRef idx="0">
+            <a:schemeClr val="accent1"/>
+          </a:effectRef>
+          <a:fontRef idx="minor">
+            <a:schemeClr val="lt1"/>
+          </a:fontRef>
+        </p:style>
+        <p:txBody>
+          <a:bodyPr rtlCol="0" anchor="ctr"/>
+          <a:lstStyle/>
+          <a:p>
+            <a:pPr algn="ctr"/>
+            <a:endParaRPr lang="nl-BE">
+              <a:ln>
+                <a:solidFill>
+                  <a:schemeClr val="bg1"/>
+                </a:solidFill>
+              </a:ln>
+              <a:solidFill>
+                <a:schemeClr val="bg1"/>
+              </a:solidFill>
+            </a:endParaRPr>
+          </a:p>
+        </p:txBody>
+      </p:sp>
+      <p:pic>
+        <p:nvPicPr>
+          <p:cNvPr id="4" name="Afbeelding 3">
+            <a:extLst>
+              <a:ext uri="{FF2B5EF4-FFF2-40B4-BE49-F238E27FC236}">
+                <a16:creationId xmlns:a16="http://schemas.microsoft.com/office/drawing/2014/main" id="{151B91A5-BD13-3208-35A9-E813890A37E1}"/>
+              </a:ext>
+            </a:extLst>
+          </p:cNvPr>
+          <p:cNvPicPr>
+            <a:picLocks noChangeAspect="1"/>
+          </p:cNvPicPr>
+          <p:nvPr/>
+        </p:nvPicPr>
+        <p:blipFill rotWithShape="1">
+          <a:blip r:embed="rId3">
+            <a:alphaModFix amt="70000"/>
+            <a:extLst>
+              <a:ext uri="{BEBA8EAE-BF5A-486C-A8C5-ECC9F3942E4B}">
+                <a14:imgProps xmlns:a14="http://schemas.microsoft.com/office/drawing/2010/main">
+                  <a14:imgLayer r:embed="rId4">
+                    <a14:imgEffect>
+                      <a14:sharpenSoften amount="50000"/>
+                    </a14:imgEffect>
+                  </a14:imgLayer>
+                </a14:imgProps>
+              </a:ext>
+            </a:extLst>
+          </a:blip>
+          <a:srcRect r="22857"/>
+          <a:stretch/>
+        </p:blipFill>
+        <p:spPr>
+          <a:xfrm>
+            <a:off x="2949146" y="2911046"/>
+            <a:ext cx="2575130" cy="1134876"/>
+          </a:xfrm>
+          <a:prstGeom prst="rect">
+            <a:avLst/>
+          </a:prstGeom>
+        </p:spPr>
+      </p:pic>
+      <p:sp>
+        <p:nvSpPr>
+          <p:cNvPr id="9" name="Rechthoek 8">
+            <a:extLst>
+              <a:ext uri="{FF2B5EF4-FFF2-40B4-BE49-F238E27FC236}">
+                <a16:creationId xmlns:a16="http://schemas.microsoft.com/office/drawing/2014/main" id="{904B6884-B04F-2CEE-E185-39CF14605D92}"/>
+              </a:ext>
+            </a:extLst>
+          </p:cNvPr>
+          <p:cNvSpPr/>
+          <p:nvPr/>
+        </p:nvSpPr>
+        <p:spPr>
+          <a:xfrm>
+            <a:off x="5647844" y="2406994"/>
+            <a:ext cx="1358376" cy="514350"/>
+          </a:xfrm>
+          <a:prstGeom prst="rect">
+            <a:avLst/>
+          </a:prstGeom>
+          <a:solidFill>
+            <a:schemeClr val="bg1"/>
+          </a:solidFill>
+          <a:ln>
+            <a:solidFill>
+              <a:schemeClr val="bg1"/>
+            </a:solidFill>
+          </a:ln>
+        </p:spPr>
+        <p:style>
+          <a:lnRef idx="2">
+            <a:schemeClr val="accent1">
+              <a:shade val="15000"/>
+            </a:schemeClr>
+          </a:lnRef>
+          <a:fillRef idx="1">
+            <a:schemeClr val="accent1"/>
+          </a:fillRef>
+          <a:effectRef idx="0">
+            <a:schemeClr val="accent1"/>
+          </a:effectRef>
+          <a:fontRef idx="minor">
+            <a:schemeClr val="lt1"/>
+          </a:fontRef>
+        </p:style>
+        <p:txBody>
+          <a:bodyPr rtlCol="0" anchor="ctr"/>
+          <a:lstStyle/>
+          <a:p>
+            <a:pPr algn="ctr"/>
+            <a:endParaRPr lang="nl-BE">
+              <a:ln>
+                <a:solidFill>
+                  <a:schemeClr val="bg1"/>
+                </a:solidFill>
+              </a:ln>
+              <a:solidFill>
+                <a:schemeClr val="bg1"/>
+              </a:solidFill>
+            </a:endParaRPr>
+          </a:p>
+        </p:txBody>
+      </p:sp>
+    </p:spTree>
+    <p:extLst>
+      <p:ext uri="{BB962C8B-B14F-4D97-AF65-F5344CB8AC3E}">
+        <p14:creationId xmlns:p14="http://schemas.microsoft.com/office/powerpoint/2010/main" val="2476538825"/>
+      </p:ext>
+    </p:extLst>
+  </p:cSld>
+  <p:clrMapOvr>
+    <a:masterClrMapping/>
+  </p:clrMapOvr>
+</p:sld>
+</file>
+
 <file path=ppt/theme/theme1.xml><?xml version="1.0" encoding="utf-8"?>
 <a:theme xmlns:a="http://schemas.openxmlformats.org/drawingml/2006/main" name="Kantoorthema">
   <a:themeElements>

</xml_diff>